<commit_message>
updated the test files and made a script to test user input, adobe seems to not allow popups
</commit_message>
<xml_diff>
--- a/test_pdf_modifed.pptx
+++ b/test_pdf_modifed.pptx
@@ -3140,22 +3140,41 @@
             <a:pPr algn="ctr"/>
             <a:r>
               <a:rPr lang="en-US" dirty="0" smtClean="0"/>
-              <a:t>1. this thing</a:t>
-            </a:r>
+              <a:t>1. </a:t>
+            </a:r>
+            <a:r>
+              <a:rPr lang="en-US" dirty="0" smtClean="0"/>
+              <a:t>Changed </a:t>
+            </a:r>
+            <a:r>
+              <a:rPr lang="en-US" dirty="0" smtClean="0"/>
+              <a:t>thing</a:t>
+            </a:r>
+            <a:endParaRPr lang="en-US" dirty="0" smtClean="0"/>
           </a:p>
           <a:p>
             <a:pPr algn="ctr"/>
             <a:r>
               <a:rPr lang="en-US" dirty="0" smtClean="0"/>
-              <a:t>2 that thing</a:t>
-            </a:r>
+              <a:t>2 </a:t>
+            </a:r>
+            <a:r>
+              <a:rPr lang="en-US" dirty="0" smtClean="0"/>
+              <a:t>other thing</a:t>
+            </a:r>
+            <a:endParaRPr lang="en-US" dirty="0" smtClean="0"/>
           </a:p>
           <a:p>
             <a:pPr algn="ctr"/>
             <a:r>
               <a:rPr lang="en-US" dirty="0" smtClean="0"/>
-              <a:t>3. Another thing</a:t>
-            </a:r>
+              <a:t>3. </a:t>
+            </a:r>
+            <a:r>
+              <a:rPr lang="en-US" dirty="0" smtClean="0"/>
+              <a:t>Final thing</a:t>
+            </a:r>
+            <a:endParaRPr lang="en-US" dirty="0" smtClean="0"/>
           </a:p>
         </p:txBody>
       </p:sp>

</xml_diff>